<commit_message>
added comments and a keyfile
</commit_message>
<xml_diff>
--- a/public/slides/output.pptx
+++ b/public/slides/output.pptx
@@ -3108,7 +3108,7 @@
           <a:lstStyle/>
           <a:p>
             <a:r>
-              <a:t>Chemistry: An Introduction</a:t>
+              <a:t>The Importance of Sleep</a:t>
             </a:r>
           </a:p>
         </p:txBody>
@@ -3133,7 +3133,7 @@
               <a:defRPr sz="1200"/>
             </a:pPr>
             <a:r>
-              <a:t>Chemistry is the study of matter and the changes it undergoes. </a:t>
+              <a:t>Sleep is essential for our physical and mental health. </a:t>
             </a:r>
           </a:p>
           <a:p>
@@ -3141,7 +3141,7 @@
               <a:defRPr sz="1200"/>
             </a:pPr>
             <a:r>
-              <a:t>It is a branch of physical science that studies the composition, structure, properties, and behavior of matter. </a:t>
+              <a:t>It helps us to stay alert and focused throughout the day. </a:t>
             </a:r>
           </a:p>
           <a:p>
@@ -3149,7 +3149,23 @@
               <a:defRPr sz="1200"/>
             </a:pPr>
             <a:r>
-              <a:t>Chemistry is a very important part of our everyday lives, from the food we eat to the air we breathe. </a:t>
+              <a:t>It helps to regulate our hormones and metabolism. </a:t>
+            </a:r>
+          </a:p>
+          <a:p>
+            <a:pPr lvl="1">
+              <a:defRPr sz="1200"/>
+            </a:pPr>
+            <a:r>
+              <a:t>It helps to reduce stress and improve our mood. </a:t>
+            </a:r>
+          </a:p>
+          <a:p>
+            <a:pPr lvl="1">
+              <a:defRPr sz="1200"/>
+            </a:pPr>
+            <a:r>
+              <a:t>It helps to strengthen our immune system. </a:t>
             </a:r>
           </a:p>
         </p:txBody>
@@ -3229,7 +3245,7 @@
           <a:lstStyle/>
           <a:p>
             <a:r>
-              <a:t>Chemical Reactions</a:t>
+              <a:t>Types of Sleep</a:t>
             </a:r>
           </a:p>
         </p:txBody>
@@ -3254,7 +3270,7 @@
               <a:defRPr sz="1200"/>
             </a:pPr>
             <a:r>
-              <a:t>Chemical reactions are processes in which one or more substances are changed into one or more new substances. </a:t>
+              <a:t>Non-REM sleep: This is the deepest stage of sleep and is important for physical restoration. </a:t>
             </a:r>
           </a:p>
           <a:p>
@@ -3262,7 +3278,7 @@
               <a:defRPr sz="1200"/>
             </a:pPr>
             <a:r>
-              <a:t>Chemical reactions involve the breaking and forming of chemical bonds. </a:t>
+              <a:t>REM sleep: This is the stage of sleep when we dream and is important for mental restoration. </a:t>
             </a:r>
           </a:p>
           <a:p>
@@ -3270,7 +3286,7 @@
               <a:defRPr sz="1200"/>
             </a:pPr>
             <a:r>
-              <a:t>Chemical reactions are essential for life, as they are responsible for the production of energy and the formation of new molecules. </a:t>
+              <a:t>Napping: This is a short period of sleep during the day and can help to improve alertness and performance. </a:t>
             </a:r>
           </a:p>
         </p:txBody>
@@ -3350,7 +3366,7 @@
           <a:lstStyle/>
           <a:p>
             <a:r>
-              <a:t>Chemical Equations</a:t>
+              <a:t>Tips for Better Sleep</a:t>
             </a:r>
           </a:p>
         </p:txBody>
@@ -3375,7 +3391,7 @@
               <a:defRPr sz="1200"/>
             </a:pPr>
             <a:r>
-              <a:t>Chemical equations are used to represent chemical reactions. </a:t>
+              <a:t>Establish a regular sleep schedule and stick to it. </a:t>
             </a:r>
           </a:p>
           <a:p>
@@ -3383,7 +3399,7 @@
               <a:defRPr sz="1200"/>
             </a:pPr>
             <a:r>
-              <a:t>They are written using symbols and formulas to represent the reactants and products of a reaction. </a:t>
+              <a:t>Avoid caffeine, alcohol, and nicotine before bed. </a:t>
             </a:r>
           </a:p>
           <a:p>
@@ -3391,7 +3407,23 @@
               <a:defRPr sz="1200"/>
             </a:pPr>
             <a:r>
-              <a:t>Chemical equations are used to calculate the amount of reactants and products needed for a reaction to occur. </a:t>
+              <a:t>Exercise regularly but not too close to bedtime. </a:t>
+            </a:r>
+          </a:p>
+          <a:p>
+            <a:pPr lvl="1">
+              <a:defRPr sz="1200"/>
+            </a:pPr>
+            <a:r>
+              <a:t>Avoid screens and bright lights before bed. </a:t>
+            </a:r>
+          </a:p>
+          <a:p>
+            <a:pPr lvl="1">
+              <a:defRPr sz="1200"/>
+            </a:pPr>
+            <a:r>
+              <a:t>Create a comfortable sleep environment. </a:t>
             </a:r>
           </a:p>
         </p:txBody>
@@ -3471,7 +3503,7 @@
           <a:lstStyle/>
           <a:p>
             <a:r>
-              <a:t>Chemical Bonds</a:t>
+              <a:t>Signs of Poor Sleep</a:t>
             </a:r>
           </a:p>
         </p:txBody>
@@ -3496,7 +3528,7 @@
               <a:defRPr sz="1200"/>
             </a:pPr>
             <a:r>
-              <a:t>Chemical bonds are the forces that hold atoms together. </a:t>
+              <a:t>Difficulty falling asleep or staying asleep. </a:t>
             </a:r>
           </a:p>
           <a:p>
@@ -3504,7 +3536,7 @@
               <a:defRPr sz="1200"/>
             </a:pPr>
             <a:r>
-              <a:t>There are three main types of chemical bonds: covalent, ionic, and metallic. </a:t>
+              <a:t>Feeling tired during the day. </a:t>
             </a:r>
           </a:p>
           <a:p>
@@ -3512,7 +3544,23 @@
               <a:defRPr sz="1200"/>
             </a:pPr>
             <a:r>
-              <a:t>Chemical bonds are essential for the formation of molecules and compounds. </a:t>
+              <a:t>Difficulty concentrating. </a:t>
+            </a:r>
+          </a:p>
+          <a:p>
+            <a:pPr lvl="1">
+              <a:defRPr sz="1200"/>
+            </a:pPr>
+            <a:r>
+              <a:t>Irritability or mood swings. </a:t>
+            </a:r>
+          </a:p>
+          <a:p>
+            <a:pPr lvl="1">
+              <a:defRPr sz="1200"/>
+            </a:pPr>
+            <a:r>
+              <a:t>Low energy levels. </a:t>
             </a:r>
           </a:p>
         </p:txBody>
@@ -3592,7 +3640,7 @@
           <a:lstStyle/>
           <a:p>
             <a:r>
-              <a:t>Chemical Properties</a:t>
+              <a:t>Conclusion</a:t>
             </a:r>
           </a:p>
         </p:txBody>
@@ -3613,27 +3661,11 @@
           <a:lstStyle/>
           <a:p/>
           <a:p>
-            <a:pPr lvl="1">
+            <a:pPr>
               <a:defRPr sz="1200"/>
             </a:pPr>
             <a:r>
-              <a:t>Chemical properties are characteristics of a substance that can be observed during a chemical reaction. </a:t>
-            </a:r>
-          </a:p>
-          <a:p>
-            <a:pPr lvl="1">
-              <a:defRPr sz="1200"/>
-            </a:pPr>
-            <a:r>
-              <a:t>Examples of chemical properties include flammability, reactivity, and solubility. </a:t>
-            </a:r>
-          </a:p>
-          <a:p>
-            <a:pPr lvl="1">
-              <a:defRPr sz="1200"/>
-            </a:pPr>
-            <a:r>
-              <a:t>Chemical properties are used to identify and classify different substances.</a:t>
+              <a:t>Getting enough quality sleep is essential for our physical and mental health. It is important to establish a regular sleep schedule and create a comfortable sleep environment. If you are having difficulty sleeping, it is important to talk to your doctor.</a:t>
             </a:r>
           </a:p>
         </p:txBody>

</xml_diff>